<commit_message>
Fixing some documentation errors
Signed-off-by: Felipe Pedroso <f.pedroso677@gmail.com>
</commit_message>
<xml_diff>
--- a/docs/Trabalho_TPG_Fluxograma.pptx
+++ b/docs/Trabalho_TPG_Fluxograma.pptx
@@ -106,6 +106,11 @@
       </a:defRPr>
     </a:lvl9pPr>
   </p:defaultTextStyle>
+  <p:extLst>
+    <p:ext uri="{EFAFB233-063F-42B5-8137-9DF3F51BA10A}">
+      <p15:sldGuideLst xmlns:p15="http://schemas.microsoft.com/office/powerpoint/2012/main"/>
+    </p:ext>
+  </p:extLst>
 </p:presentation>
 </file>
 
@@ -4618,6 +4623,36 @@
           </a:p>
         </p:txBody>
       </p:sp>
+      <p:sp>
+        <p:nvSpPr>
+          <p:cNvPr id="23" name="CaixaDeTexto 22"/>
+          <p:cNvSpPr txBox="1"/>
+          <p:nvPr/>
+        </p:nvSpPr>
+        <p:spPr>
+          <a:xfrm>
+            <a:off x="5950768" y="5546446"/>
+            <a:ext cx="290464" cy="369332"/>
+          </a:xfrm>
+          <a:prstGeom prst="rect">
+            <a:avLst/>
+          </a:prstGeom>
+          <a:noFill/>
+        </p:spPr>
+        <p:txBody>
+          <a:bodyPr wrap="none" rtlCol="0">
+            <a:spAutoFit/>
+          </a:bodyPr>
+          <a:lstStyle/>
+          <a:p>
+            <a:r>
+              <a:rPr lang="pt-BR" dirty="0" smtClean="0"/>
+              <a:t>S</a:t>
+            </a:r>
+            <a:endParaRPr lang="en-US" dirty="0"/>
+          </a:p>
+        </p:txBody>
+      </p:sp>
     </p:spTree>
     <p:extLst>
       <p:ext uri="{BB962C8B-B14F-4D97-AF65-F5344CB8AC3E}">

</xml_diff>